<commit_message>
6 bureau - Aqyali Carapuce
</commit_message>
<xml_diff>
--- a/Présentation1.pptx
+++ b/Présentation1.pptx
@@ -245,7 +245,7 @@
           <a:p>
             <a:fld id="{661C3B13-9C46-40DF-9493-B022B6F650DC}" type="datetimeFigureOut">
               <a:rPr lang="fr-FR" smtClean="0"/>
-              <a:t>15/11/2023</a:t>
+              <a:t>19/12/2023</a:t>
             </a:fld>
             <a:endParaRPr lang="fr-FR"/>
           </a:p>
@@ -415,7 +415,7 @@
           <a:p>
             <a:fld id="{661C3B13-9C46-40DF-9493-B022B6F650DC}" type="datetimeFigureOut">
               <a:rPr lang="fr-FR" smtClean="0"/>
-              <a:t>15/11/2023</a:t>
+              <a:t>19/12/2023</a:t>
             </a:fld>
             <a:endParaRPr lang="fr-FR"/>
           </a:p>
@@ -595,7 +595,7 @@
           <a:p>
             <a:fld id="{661C3B13-9C46-40DF-9493-B022B6F650DC}" type="datetimeFigureOut">
               <a:rPr lang="fr-FR" smtClean="0"/>
-              <a:t>15/11/2023</a:t>
+              <a:t>19/12/2023</a:t>
             </a:fld>
             <a:endParaRPr lang="fr-FR"/>
           </a:p>
@@ -765,7 +765,7 @@
           <a:p>
             <a:fld id="{661C3B13-9C46-40DF-9493-B022B6F650DC}" type="datetimeFigureOut">
               <a:rPr lang="fr-FR" smtClean="0"/>
-              <a:t>15/11/2023</a:t>
+              <a:t>19/12/2023</a:t>
             </a:fld>
             <a:endParaRPr lang="fr-FR"/>
           </a:p>
@@ -1011,7 +1011,7 @@
           <a:p>
             <a:fld id="{661C3B13-9C46-40DF-9493-B022B6F650DC}" type="datetimeFigureOut">
               <a:rPr lang="fr-FR" smtClean="0"/>
-              <a:t>15/11/2023</a:t>
+              <a:t>19/12/2023</a:t>
             </a:fld>
             <a:endParaRPr lang="fr-FR"/>
           </a:p>
@@ -1243,7 +1243,7 @@
           <a:p>
             <a:fld id="{661C3B13-9C46-40DF-9493-B022B6F650DC}" type="datetimeFigureOut">
               <a:rPr lang="fr-FR" smtClean="0"/>
-              <a:t>15/11/2023</a:t>
+              <a:t>19/12/2023</a:t>
             </a:fld>
             <a:endParaRPr lang="fr-FR"/>
           </a:p>
@@ -1610,7 +1610,7 @@
           <a:p>
             <a:fld id="{661C3B13-9C46-40DF-9493-B022B6F650DC}" type="datetimeFigureOut">
               <a:rPr lang="fr-FR" smtClean="0"/>
-              <a:t>15/11/2023</a:t>
+              <a:t>19/12/2023</a:t>
             </a:fld>
             <a:endParaRPr lang="fr-FR"/>
           </a:p>
@@ -1728,7 +1728,7 @@
           <a:p>
             <a:fld id="{661C3B13-9C46-40DF-9493-B022B6F650DC}" type="datetimeFigureOut">
               <a:rPr lang="fr-FR" smtClean="0"/>
-              <a:t>15/11/2023</a:t>
+              <a:t>19/12/2023</a:t>
             </a:fld>
             <a:endParaRPr lang="fr-FR"/>
           </a:p>
@@ -1823,7 +1823,7 @@
           <a:p>
             <a:fld id="{661C3B13-9C46-40DF-9493-B022B6F650DC}" type="datetimeFigureOut">
               <a:rPr lang="fr-FR" smtClean="0"/>
-              <a:t>15/11/2023</a:t>
+              <a:t>19/12/2023</a:t>
             </a:fld>
             <a:endParaRPr lang="fr-FR"/>
           </a:p>
@@ -2100,7 +2100,7 @@
           <a:p>
             <a:fld id="{661C3B13-9C46-40DF-9493-B022B6F650DC}" type="datetimeFigureOut">
               <a:rPr lang="fr-FR" smtClean="0"/>
-              <a:t>15/11/2023</a:t>
+              <a:t>19/12/2023</a:t>
             </a:fld>
             <a:endParaRPr lang="fr-FR"/>
           </a:p>
@@ -2353,7 +2353,7 @@
           <a:p>
             <a:fld id="{661C3B13-9C46-40DF-9493-B022B6F650DC}" type="datetimeFigureOut">
               <a:rPr lang="fr-FR" smtClean="0"/>
-              <a:t>15/11/2023</a:t>
+              <a:t>19/12/2023</a:t>
             </a:fld>
             <a:endParaRPr lang="fr-FR"/>
           </a:p>
@@ -2566,7 +2566,7 @@
           <a:p>
             <a:fld id="{661C3B13-9C46-40DF-9493-B022B6F650DC}" type="datetimeFigureOut">
               <a:rPr lang="fr-FR" smtClean="0"/>
-              <a:t>15/11/2023</a:t>
+              <a:t>19/12/2023</a:t>
             </a:fld>
             <a:endParaRPr lang="fr-FR"/>
           </a:p>
@@ -3526,130 +3526,115 @@
           </p:spPr>
         </p:pic>
       </p:grpSp>
-      <p:grpSp>
-        <p:nvGrpSpPr>
-          <p:cNvPr id="11" name="Groupe 10"/>
-          <p:cNvGrpSpPr/>
+      <p:pic>
+        <p:nvPicPr>
+          <p:cNvPr id="4" name="Image 3"/>
+          <p:cNvPicPr>
+            <a:picLocks noChangeAspect="1"/>
+          </p:cNvPicPr>
           <p:nvPr/>
-        </p:nvGrpSpPr>
-        <p:grpSpPr>
+        </p:nvPicPr>
+        <p:blipFill rotWithShape="1">
+          <a:blip r:embed="rId6" cstate="print">
+            <a:duotone>
+              <a:schemeClr val="accent3">
+                <a:shade val="45000"/>
+                <a:satMod val="135000"/>
+              </a:schemeClr>
+              <a:prstClr val="white"/>
+            </a:duotone>
+            <a:extLst>
+              <a:ext uri="{28A0092B-C50C-407E-A947-70E740481C1C}">
+                <a14:useLocalDpi xmlns:a14="http://schemas.microsoft.com/office/drawing/2010/main" val="0"/>
+              </a:ext>
+            </a:extLst>
+          </a:blip>
+          <a:srcRect t="1158" b="2552"/>
+          <a:stretch/>
+        </p:blipFill>
+        <p:spPr>
           <a:xfrm>
-            <a:off x="1968554" y="1288533"/>
-            <a:ext cx="5965032" cy="1260000"/>
-            <a:chOff x="1968554" y="1288533"/>
-            <a:chExt cx="5965032" cy="1260000"/>
+            <a:off x="1131030" y="1457864"/>
+            <a:ext cx="1383680" cy="1000670"/>
           </a:xfrm>
-        </p:grpSpPr>
-        <p:pic>
-          <p:nvPicPr>
-            <p:cNvPr id="4" name="Image 3"/>
-            <p:cNvPicPr>
-              <a:picLocks noChangeAspect="1"/>
-            </p:cNvPicPr>
-            <p:nvPr/>
-          </p:nvPicPr>
-          <p:blipFill rotWithShape="1">
-            <a:blip r:embed="rId6" cstate="print">
-              <a:duotone>
-                <a:schemeClr val="accent3">
-                  <a:shade val="45000"/>
-                  <a:satMod val="135000"/>
-                </a:schemeClr>
-                <a:prstClr val="white"/>
-              </a:duotone>
-              <a:extLst>
-                <a:ext uri="{28A0092B-C50C-407E-A947-70E740481C1C}">
-                  <a14:useLocalDpi xmlns:a14="http://schemas.microsoft.com/office/drawing/2010/main" val="0"/>
-                </a:ext>
-              </a:extLst>
-            </a:blip>
-            <a:srcRect t="1158" b="2552"/>
-            <a:stretch/>
-          </p:blipFill>
-          <p:spPr>
-            <a:xfrm>
-              <a:off x="1968554" y="1378534"/>
-              <a:ext cx="1493374" cy="1080000"/>
-            </a:xfrm>
-            <a:prstGeom prst="rect">
-              <a:avLst/>
-            </a:prstGeom>
-          </p:spPr>
-        </p:pic>
-        <p:pic>
-          <p:nvPicPr>
-            <p:cNvPr id="8" name="Image 7"/>
-            <p:cNvPicPr>
-              <a:picLocks noChangeAspect="1"/>
-            </p:cNvPicPr>
-            <p:nvPr/>
-          </p:nvPicPr>
-          <p:blipFill rotWithShape="1">
-            <a:blip r:embed="rId7">
-              <a:duotone>
-                <a:schemeClr val="accent3">
-                  <a:shade val="45000"/>
-                  <a:satMod val="135000"/>
-                </a:schemeClr>
-                <a:prstClr val="white"/>
-              </a:duotone>
-              <a:extLst>
-                <a:ext uri="{28A0092B-C50C-407E-A947-70E740481C1C}">
-                  <a14:useLocalDpi xmlns:a14="http://schemas.microsoft.com/office/drawing/2010/main" val="0"/>
-                </a:ext>
-              </a:extLst>
-            </a:blip>
-            <a:srcRect t="6551" b="3541"/>
-            <a:stretch/>
-          </p:blipFill>
-          <p:spPr>
-            <a:xfrm>
-              <a:off x="6623156" y="1378534"/>
-              <a:ext cx="1310430" cy="1080000"/>
-            </a:xfrm>
-            <a:prstGeom prst="rect">
-              <a:avLst/>
-            </a:prstGeom>
-          </p:spPr>
-        </p:pic>
-        <p:pic>
-          <p:nvPicPr>
-            <p:cNvPr id="6" name="Image 5"/>
-            <p:cNvPicPr>
-              <a:picLocks noChangeAspect="1"/>
-            </p:cNvPicPr>
-            <p:nvPr/>
-          </p:nvPicPr>
-          <p:blipFill>
-            <a:blip r:embed="rId8" cstate="print">
-              <a:duotone>
-                <a:schemeClr val="accent3">
-                  <a:shade val="45000"/>
-                  <a:satMod val="135000"/>
-                </a:schemeClr>
-                <a:prstClr val="white"/>
-              </a:duotone>
-              <a:extLst>
-                <a:ext uri="{28A0092B-C50C-407E-A947-70E740481C1C}">
-                  <a14:useLocalDpi xmlns:a14="http://schemas.microsoft.com/office/drawing/2010/main" val="0"/>
-                </a:ext>
-              </a:extLst>
-            </a:blip>
-            <a:stretch>
-              <a:fillRect/>
-            </a:stretch>
-          </p:blipFill>
-          <p:spPr>
-            <a:xfrm>
-              <a:off x="5146417" y="1288533"/>
-              <a:ext cx="1639726" cy="1260000"/>
-            </a:xfrm>
-            <a:prstGeom prst="rect">
-              <a:avLst/>
-            </a:prstGeom>
-          </p:spPr>
-        </p:pic>
-      </p:grpSp>
+          <a:prstGeom prst="rect">
+            <a:avLst/>
+          </a:prstGeom>
+        </p:spPr>
+      </p:pic>
+      <p:pic>
+        <p:nvPicPr>
+          <p:cNvPr id="8" name="Image 7"/>
+          <p:cNvPicPr>
+            <a:picLocks noChangeAspect="1"/>
+          </p:cNvPicPr>
+          <p:nvPr/>
+        </p:nvPicPr>
+        <p:blipFill rotWithShape="1">
+          <a:blip r:embed="rId7">
+            <a:duotone>
+              <a:schemeClr val="accent3">
+                <a:shade val="45000"/>
+                <a:satMod val="135000"/>
+              </a:schemeClr>
+              <a:prstClr val="white"/>
+            </a:duotone>
+            <a:extLst>
+              <a:ext uri="{28A0092B-C50C-407E-A947-70E740481C1C}">
+                <a14:useLocalDpi xmlns:a14="http://schemas.microsoft.com/office/drawing/2010/main" val="0"/>
+              </a:ext>
+            </a:extLst>
+          </a:blip>
+          <a:srcRect t="6551" b="3541"/>
+          <a:stretch/>
+        </p:blipFill>
+        <p:spPr>
+          <a:xfrm>
+            <a:off x="5942688" y="1378534"/>
+            <a:ext cx="1310430" cy="1080000"/>
+          </a:xfrm>
+          <a:prstGeom prst="rect">
+            <a:avLst/>
+          </a:prstGeom>
+        </p:spPr>
+      </p:pic>
+      <p:pic>
+        <p:nvPicPr>
+          <p:cNvPr id="6" name="Image 5"/>
+          <p:cNvPicPr>
+            <a:picLocks noChangeAspect="1"/>
+          </p:cNvPicPr>
+          <p:nvPr/>
+        </p:nvPicPr>
+        <p:blipFill>
+          <a:blip r:embed="rId8" cstate="print">
+            <a:duotone>
+              <a:schemeClr val="accent3">
+                <a:shade val="45000"/>
+                <a:satMod val="135000"/>
+              </a:schemeClr>
+              <a:prstClr val="white"/>
+            </a:duotone>
+            <a:extLst>
+              <a:ext uri="{28A0092B-C50C-407E-A947-70E740481C1C}">
+                <a14:useLocalDpi xmlns:a14="http://schemas.microsoft.com/office/drawing/2010/main" val="0"/>
+              </a:ext>
+            </a:extLst>
+          </a:blip>
+          <a:stretch>
+            <a:fillRect/>
+          </a:stretch>
+        </p:blipFill>
+        <p:spPr>
+          <a:xfrm>
+            <a:off x="7108194" y="1288534"/>
+            <a:ext cx="1522603" cy="1170000"/>
+          </a:xfrm>
+          <a:prstGeom prst="rect">
+            <a:avLst/>
+          </a:prstGeom>
+        </p:spPr>
+      </p:pic>
       <p:pic>
         <p:nvPicPr>
           <p:cNvPr id="17" name="Image 16"/>
@@ -3679,8 +3664,8 @@
         </p:blipFill>
         <p:spPr>
           <a:xfrm>
-            <a:off x="3445130" y="1378534"/>
-            <a:ext cx="1718085" cy="1170001"/>
+            <a:off x="3495498" y="1378534"/>
+            <a:ext cx="1652005" cy="1125001"/>
           </a:xfrm>
           <a:prstGeom prst="rect">
             <a:avLst/>
@@ -3717,6 +3702,80 @@
           <a:xfrm>
             <a:off x="2138487" y="4456497"/>
             <a:ext cx="5114631" cy="1309036"/>
+          </a:xfrm>
+          <a:prstGeom prst="rect">
+            <a:avLst/>
+          </a:prstGeom>
+        </p:spPr>
+      </p:pic>
+      <p:pic>
+        <p:nvPicPr>
+          <p:cNvPr id="2" name="Image 1"/>
+          <p:cNvPicPr>
+            <a:picLocks noChangeAspect="1"/>
+          </p:cNvPicPr>
+          <p:nvPr/>
+        </p:nvPicPr>
+        <p:blipFill>
+          <a:blip r:embed="rId11" cstate="print">
+            <a:duotone>
+              <a:schemeClr val="accent3">
+                <a:shade val="45000"/>
+                <a:satMod val="135000"/>
+              </a:schemeClr>
+              <a:prstClr val="white"/>
+            </a:duotone>
+            <a:extLst>
+              <a:ext uri="{28A0092B-C50C-407E-A947-70E740481C1C}">
+                <a14:useLocalDpi xmlns:a14="http://schemas.microsoft.com/office/drawing/2010/main" val="0"/>
+              </a:ext>
+            </a:extLst>
+          </a:blip>
+          <a:stretch>
+            <a:fillRect/>
+          </a:stretch>
+        </p:blipFill>
+        <p:spPr>
+          <a:xfrm>
+            <a:off x="5080829" y="1265361"/>
+            <a:ext cx="926640" cy="1080000"/>
+          </a:xfrm>
+          <a:prstGeom prst="rect">
+            <a:avLst/>
+          </a:prstGeom>
+        </p:spPr>
+      </p:pic>
+      <p:pic>
+        <p:nvPicPr>
+          <p:cNvPr id="3" name="Image 2"/>
+          <p:cNvPicPr>
+            <a:picLocks noChangeAspect="1"/>
+          </p:cNvPicPr>
+          <p:nvPr/>
+        </p:nvPicPr>
+        <p:blipFill>
+          <a:blip r:embed="rId12" cstate="print">
+            <a:duotone>
+              <a:schemeClr val="accent3">
+                <a:shade val="45000"/>
+                <a:satMod val="135000"/>
+              </a:schemeClr>
+              <a:prstClr val="white"/>
+            </a:duotone>
+            <a:extLst>
+              <a:ext uri="{28A0092B-C50C-407E-A947-70E740481C1C}">
+                <a14:useLocalDpi xmlns:a14="http://schemas.microsoft.com/office/drawing/2010/main" val="0"/>
+              </a:ext>
+            </a:extLst>
+          </a:blip>
+          <a:stretch>
+            <a:fillRect/>
+          </a:stretch>
+        </p:blipFill>
+        <p:spPr>
+          <a:xfrm>
+            <a:off x="2374577" y="1378534"/>
+            <a:ext cx="1138173" cy="1080000"/>
           </a:xfrm>
           <a:prstGeom prst="rect">
             <a:avLst/>
@@ -3998,23 +4057,6 @@
 </file>
 
 <file path=customXml/item1.xml><?xml version="1.0" encoding="utf-8"?>
-<p:properties xmlns:p="http://schemas.microsoft.com/office/2006/metadata/properties" xmlns:xsi="http://www.w3.org/2001/XMLSchema-instance" xmlns:pc="http://schemas.microsoft.com/office/infopath/2007/PartnerControls">
-  <documentManagement>
-    <_activity xmlns="230486b7-ae46-4a7b-9810-315006c8cb07" xsi:nil="true"/>
-  </documentManagement>
-</p:properties>
-</file>
-
-<file path=customXml/item2.xml><?xml version="1.0" encoding="utf-8"?>
-<?mso-contentType ?>
-<FormTemplates xmlns="http://schemas.microsoft.com/sharepoint/v3/contenttype/forms">
-  <Display>DocumentLibraryForm</Display>
-  <Edit>DocumentLibraryForm</Edit>
-  <New>DocumentLibraryForm</New>
-</FormTemplates>
-</file>
-
-<file path=customXml/item3.xml><?xml version="1.0" encoding="utf-8"?>
 <ct:contentTypeSchema xmlns:ct="http://schemas.microsoft.com/office/2006/metadata/contentType" xmlns:ma="http://schemas.microsoft.com/office/2006/metadata/properties/metaAttributes" ct:_="" ma:_="" ma:contentTypeName="Document" ma:contentTypeID="0x0101005F1C601D9B9C5C4292CFD4002C6BAA3A" ma:contentTypeVersion="17" ma:contentTypeDescription="Crée un document." ma:contentTypeScope="" ma:versionID="a7bfeedd2762d115df800ee9cca42e60">
   <xsd:schema xmlns:xsd="http://www.w3.org/2001/XMLSchema" xmlns:xs="http://www.w3.org/2001/XMLSchema" xmlns:p="http://schemas.microsoft.com/office/2006/metadata/properties" xmlns:ns3="230486b7-ae46-4a7b-9810-315006c8cb07" xmlns:ns4="c8438557-ce8b-4c4c-b94d-6a2491d2cc6d" targetNamespace="http://schemas.microsoft.com/office/2006/metadata/properties" ma:root="true" ma:fieldsID="73195a20d9c65782479758781ad3e71c" ns3:_="" ns4:_="">
     <xsd:import namespace="230486b7-ae46-4a7b-9810-315006c8cb07"/>
@@ -4261,32 +4303,24 @@
 </ct:contentTypeSchema>
 </file>
 
-<file path=customXml/itemProps1.xml><?xml version="1.0" encoding="utf-8"?>
-<ds:datastoreItem xmlns:ds="http://schemas.openxmlformats.org/officeDocument/2006/customXml" ds:itemID="{6A537079-43A1-4A41-9430-55F6E45CF35A}">
-  <ds:schemaRefs>
-    <ds:schemaRef ds:uri="http://schemas.microsoft.com/office/2006/metadata/properties"/>
-    <ds:schemaRef ds:uri="http://schemas.openxmlformats.org/package/2006/metadata/core-properties"/>
-    <ds:schemaRef ds:uri="http://schemas.microsoft.com/office/infopath/2007/PartnerControls"/>
-    <ds:schemaRef ds:uri="http://purl.org/dc/dcmitype/"/>
-    <ds:schemaRef ds:uri="http://schemas.microsoft.com/office/2006/documentManagement/types"/>
-    <ds:schemaRef ds:uri="http://purl.org/dc/elements/1.1/"/>
-    <ds:schemaRef ds:uri="c8438557-ce8b-4c4c-b94d-6a2491d2cc6d"/>
-    <ds:schemaRef ds:uri="230486b7-ae46-4a7b-9810-315006c8cb07"/>
-    <ds:schemaRef ds:uri="http://www.w3.org/XML/1998/namespace"/>
-    <ds:schemaRef ds:uri="http://purl.org/dc/terms/"/>
-  </ds:schemaRefs>
-</ds:datastoreItem>
+<file path=customXml/item2.xml><?xml version="1.0" encoding="utf-8"?>
+<?mso-contentType ?>
+<FormTemplates xmlns="http://schemas.microsoft.com/sharepoint/v3/contenttype/forms">
+  <Display>DocumentLibraryForm</Display>
+  <Edit>DocumentLibraryForm</Edit>
+  <New>DocumentLibraryForm</New>
+</FormTemplates>
 </file>
 
-<file path=customXml/itemProps2.xml><?xml version="1.0" encoding="utf-8"?>
-<ds:datastoreItem xmlns:ds="http://schemas.openxmlformats.org/officeDocument/2006/customXml" ds:itemID="{059791B8-E18E-4F68-A94A-1875CE55B6D4}">
-  <ds:schemaRefs>
-    <ds:schemaRef ds:uri="http://schemas.microsoft.com/sharepoint/v3/contenttype/forms"/>
-  </ds:schemaRefs>
-</ds:datastoreItem>
+<file path=customXml/item3.xml><?xml version="1.0" encoding="utf-8"?>
+<p:properties xmlns:p="http://schemas.microsoft.com/office/2006/metadata/properties" xmlns:xsi="http://www.w3.org/2001/XMLSchema-instance" xmlns:pc="http://schemas.microsoft.com/office/infopath/2007/PartnerControls">
+  <documentManagement>
+    <_activity xmlns="230486b7-ae46-4a7b-9810-315006c8cb07" xsi:nil="true"/>
+  </documentManagement>
+</p:properties>
 </file>
 
-<file path=customXml/itemProps3.xml><?xml version="1.0" encoding="utf-8"?>
+<file path=customXml/itemProps1.xml><?xml version="1.0" encoding="utf-8"?>
 <ds:datastoreItem xmlns:ds="http://schemas.openxmlformats.org/officeDocument/2006/customXml" ds:itemID="{B71F9509-9A94-453E-B3AA-678E782E3622}">
   <ds:schemaRefs>
     <ds:schemaRef ds:uri="http://schemas.microsoft.com/office/2006/metadata/contentType"/>
@@ -4303,4 +4337,29 @@
     <ds:schemaRef ds:uri="http://schemas.microsoft.com/internal/obd"/>
   </ds:schemaRefs>
 </ds:datastoreItem>
+</file>
+
+<file path=customXml/itemProps2.xml><?xml version="1.0" encoding="utf-8"?>
+<ds:datastoreItem xmlns:ds="http://schemas.openxmlformats.org/officeDocument/2006/customXml" ds:itemID="{059791B8-E18E-4F68-A94A-1875CE55B6D4}">
+  <ds:schemaRefs>
+    <ds:schemaRef ds:uri="http://schemas.microsoft.com/sharepoint/v3/contenttype/forms"/>
+  </ds:schemaRefs>
+</ds:datastoreItem>
+</file>
+
+<file path=customXml/itemProps3.xml><?xml version="1.0" encoding="utf-8"?>
+<ds:datastoreItem xmlns:ds="http://schemas.openxmlformats.org/officeDocument/2006/customXml" ds:itemID="{6A537079-43A1-4A41-9430-55F6E45CF35A}">
+  <ds:schemaRefs>
+    <ds:schemaRef ds:uri="http://purl.org/dc/terms/"/>
+    <ds:schemaRef ds:uri="http://schemas.microsoft.com/office/2006/documentManagement/types"/>
+    <ds:schemaRef ds:uri="http://purl.org/dc/elements/1.1/"/>
+    <ds:schemaRef ds:uri="http://schemas.microsoft.com/office/2006/metadata/properties"/>
+    <ds:schemaRef ds:uri="230486b7-ae46-4a7b-9810-315006c8cb07"/>
+    <ds:schemaRef ds:uri="http://purl.org/dc/dcmitype/"/>
+    <ds:schemaRef ds:uri="http://www.w3.org/XML/1998/namespace"/>
+    <ds:schemaRef ds:uri="http://schemas.microsoft.com/office/infopath/2007/PartnerControls"/>
+    <ds:schemaRef ds:uri="http://schemas.openxmlformats.org/package/2006/metadata/core-properties"/>
+    <ds:schemaRef ds:uri="c8438557-ce8b-4c4c-b94d-6a2491d2cc6d"/>
+  </ds:schemaRefs>
+</ds:datastoreItem>
 </file>
</xml_diff>